<commit_message>
feat: show version dynamically in footer fix: env admin password won't take effect, website should not scroll, not delete 0 size file on start up, real empty pptx template
</commit_message>
<xml_diff>
--- a/backend/templates/blank.pptx
+++ b/backend/templates/blank.pptx
@@ -4,9 +4,6 @@
   <p:sldMasterIdLst>
     <p:sldMasterId id="2147483648" r:id="rId1"/>
   </p:sldMasterIdLst>
-  <p:sldIdLst>
-    <p:sldId id="256" r:id="rId2"/>
-  </p:sldIdLst>
   <p:sldSz cx="12192000" cy="6858000"/>
   <p:notesSz cx="6858000" cy="9144000"/>
   <p:defaultTextStyle>
@@ -104,6 +101,11 @@
       </a:defRPr>
     </a:lvl9pPr>
   </p:defaultTextStyle>
+  <p:extLst>
+    <p:ext uri="{EFAFB233-063F-42B5-8137-9DF3F51BA10A}">
+      <p15:sldGuideLst xmlns:p15="http://schemas.microsoft.com/office/powerpoint/2012/main"/>
+    </p:ext>
+  </p:extLst>
 </p:presentation>
 </file>
 
@@ -254,7 +256,7 @@
           <a:p>
             <a:fld id="{8925CE27-D13E-4DAC-8657-29629A37734A}" type="datetimeFigureOut">
               <a:rPr lang="zh-CN" altLang="en-US" smtClean="0"/>
-              <a:t>2025/9/25</a:t>
+              <a:t>2025/10/1</a:t>
             </a:fld>
             <a:endParaRPr lang="zh-CN" altLang="en-US"/>
           </a:p>
@@ -452,7 +454,7 @@
           <a:p>
             <a:fld id="{8925CE27-D13E-4DAC-8657-29629A37734A}" type="datetimeFigureOut">
               <a:rPr lang="zh-CN" altLang="en-US" smtClean="0"/>
-              <a:t>2025/9/25</a:t>
+              <a:t>2025/10/1</a:t>
             </a:fld>
             <a:endParaRPr lang="zh-CN" altLang="en-US"/>
           </a:p>
@@ -660,7 +662,7 @@
           <a:p>
             <a:fld id="{8925CE27-D13E-4DAC-8657-29629A37734A}" type="datetimeFigureOut">
               <a:rPr lang="zh-CN" altLang="en-US" smtClean="0"/>
-              <a:t>2025/9/25</a:t>
+              <a:t>2025/10/1</a:t>
             </a:fld>
             <a:endParaRPr lang="zh-CN" altLang="en-US"/>
           </a:p>
@@ -858,7 +860,7 @@
           <a:p>
             <a:fld id="{8925CE27-D13E-4DAC-8657-29629A37734A}" type="datetimeFigureOut">
               <a:rPr lang="zh-CN" altLang="en-US" smtClean="0"/>
-              <a:t>2025/9/25</a:t>
+              <a:t>2025/10/1</a:t>
             </a:fld>
             <a:endParaRPr lang="zh-CN" altLang="en-US"/>
           </a:p>
@@ -1133,7 +1135,7 @@
           <a:p>
             <a:fld id="{8925CE27-D13E-4DAC-8657-29629A37734A}" type="datetimeFigureOut">
               <a:rPr lang="zh-CN" altLang="en-US" smtClean="0"/>
-              <a:t>2025/9/25</a:t>
+              <a:t>2025/10/1</a:t>
             </a:fld>
             <a:endParaRPr lang="zh-CN" altLang="en-US"/>
           </a:p>
@@ -1398,7 +1400,7 @@
           <a:p>
             <a:fld id="{8925CE27-D13E-4DAC-8657-29629A37734A}" type="datetimeFigureOut">
               <a:rPr lang="zh-CN" altLang="en-US" smtClean="0"/>
-              <a:t>2025/9/25</a:t>
+              <a:t>2025/10/1</a:t>
             </a:fld>
             <a:endParaRPr lang="zh-CN" altLang="en-US"/>
           </a:p>
@@ -1810,7 +1812,7 @@
           <a:p>
             <a:fld id="{8925CE27-D13E-4DAC-8657-29629A37734A}" type="datetimeFigureOut">
               <a:rPr lang="zh-CN" altLang="en-US" smtClean="0"/>
-              <a:t>2025/9/25</a:t>
+              <a:t>2025/10/1</a:t>
             </a:fld>
             <a:endParaRPr lang="zh-CN" altLang="en-US"/>
           </a:p>
@@ -1951,7 +1953,7 @@
           <a:p>
             <a:fld id="{8925CE27-D13E-4DAC-8657-29629A37734A}" type="datetimeFigureOut">
               <a:rPr lang="zh-CN" altLang="en-US" smtClean="0"/>
-              <a:t>2025/9/25</a:t>
+              <a:t>2025/10/1</a:t>
             </a:fld>
             <a:endParaRPr lang="zh-CN" altLang="en-US"/>
           </a:p>
@@ -2064,7 +2066,7 @@
           <a:p>
             <a:fld id="{8925CE27-D13E-4DAC-8657-29629A37734A}" type="datetimeFigureOut">
               <a:rPr lang="zh-CN" altLang="en-US" smtClean="0"/>
-              <a:t>2025/9/25</a:t>
+              <a:t>2025/10/1</a:t>
             </a:fld>
             <a:endParaRPr lang="zh-CN" altLang="en-US"/>
           </a:p>
@@ -2375,7 +2377,7 @@
           <a:p>
             <a:fld id="{8925CE27-D13E-4DAC-8657-29629A37734A}" type="datetimeFigureOut">
               <a:rPr lang="zh-CN" altLang="en-US" smtClean="0"/>
-              <a:t>2025/9/25</a:t>
+              <a:t>2025/10/1</a:t>
             </a:fld>
             <a:endParaRPr lang="zh-CN" altLang="en-US"/>
           </a:p>
@@ -2663,7 +2665,7 @@
           <a:p>
             <a:fld id="{8925CE27-D13E-4DAC-8657-29629A37734A}" type="datetimeFigureOut">
               <a:rPr lang="zh-CN" altLang="en-US" smtClean="0"/>
-              <a:t>2025/9/25</a:t>
+              <a:t>2025/10/1</a:t>
             </a:fld>
             <a:endParaRPr lang="zh-CN" altLang="en-US"/>
           </a:p>
@@ -2904,7 +2906,7 @@
           <a:p>
             <a:fld id="{8925CE27-D13E-4DAC-8657-29629A37734A}" type="datetimeFigureOut">
               <a:rPr lang="zh-CN" altLang="en-US" smtClean="0"/>
-              <a:t>2025/9/25</a:t>
+              <a:t>2025/10/1</a:t>
             </a:fld>
             <a:endParaRPr lang="zh-CN" altLang="en-US"/>
           </a:p>
@@ -3302,86 +3304,6 @@
     </p:otherStyle>
   </p:txStyles>
 </p:sldMaster>
-</file>
-
-<file path=ppt/slides/slide1.xml><?xml version="1.0" encoding="utf-8"?>
-<p:sld xmlns:a="http://schemas.openxmlformats.org/drawingml/2006/main" xmlns:r="http://schemas.openxmlformats.org/officeDocument/2006/relationships" xmlns:p="http://schemas.openxmlformats.org/presentationml/2006/main">
-  <p:cSld>
-    <p:spTree>
-      <p:nvGrpSpPr>
-        <p:cNvPr id="1" name=""/>
-        <p:cNvGrpSpPr/>
-        <p:nvPr/>
-      </p:nvGrpSpPr>
-      <p:grpSpPr>
-        <a:xfrm>
-          <a:off x="0" y="0"/>
-          <a:ext cx="0" cy="0"/>
-          <a:chOff x="0" y="0"/>
-          <a:chExt cx="0" cy="0"/>
-        </a:xfrm>
-      </p:grpSpPr>
-      <p:sp>
-        <p:nvSpPr>
-          <p:cNvPr id="2" name="标题 1">
-            <a:extLst>
-              <a:ext uri="{FF2B5EF4-FFF2-40B4-BE49-F238E27FC236}">
-                <a16:creationId xmlns:a16="http://schemas.microsoft.com/office/drawing/2014/main" id="{ABFD092D-4060-9348-342B-126CD5B0BD77}"/>
-              </a:ext>
-            </a:extLst>
-          </p:cNvPr>
-          <p:cNvSpPr>
-            <a:spLocks noGrp="1"/>
-          </p:cNvSpPr>
-          <p:nvPr>
-            <p:ph type="ctrTitle"/>
-          </p:nvPr>
-        </p:nvSpPr>
-        <p:spPr/>
-        <p:txBody>
-          <a:bodyPr/>
-          <a:lstStyle/>
-          <a:p>
-            <a:endParaRPr lang="zh-CN" altLang="en-US"/>
-          </a:p>
-        </p:txBody>
-      </p:sp>
-      <p:sp>
-        <p:nvSpPr>
-          <p:cNvPr id="3" name="副标题 2">
-            <a:extLst>
-              <a:ext uri="{FF2B5EF4-FFF2-40B4-BE49-F238E27FC236}">
-                <a16:creationId xmlns:a16="http://schemas.microsoft.com/office/drawing/2014/main" id="{99F8B781-1605-5F42-4122-E0F079A96EFB}"/>
-              </a:ext>
-            </a:extLst>
-          </p:cNvPr>
-          <p:cNvSpPr>
-            <a:spLocks noGrp="1"/>
-          </p:cNvSpPr>
-          <p:nvPr>
-            <p:ph type="subTitle" idx="1"/>
-          </p:nvPr>
-        </p:nvSpPr>
-        <p:spPr/>
-        <p:txBody>
-          <a:bodyPr/>
-          <a:lstStyle/>
-          <a:p>
-            <a:endParaRPr lang="zh-CN" altLang="en-US"/>
-          </a:p>
-        </p:txBody>
-      </p:sp>
-    </p:spTree>
-    <p:extLst>
-      <p:ext uri="{BB962C8B-B14F-4D97-AF65-F5344CB8AC3E}">
-        <p14:creationId xmlns:p14="http://schemas.microsoft.com/office/powerpoint/2010/main" val="2487132363"/>
-      </p:ext>
-    </p:extLst>
-  </p:cSld>
-  <p:clrMapOvr>
-    <a:masterClrMapping/>
-  </p:clrMapOvr>
-</p:sld>
 </file>
 
 <file path=ppt/theme/theme1.xml><?xml version="1.0" encoding="utf-8"?>

</xml_diff>